<commit_message>
edited ppt & view
</commit_message>
<xml_diff>
--- a/cryptoSolver/Crypto-Solver.pptx
+++ b/cryptoSolver/Crypto-Solver.pptx
@@ -5,13 +5,14 @@
     <p:sldMasterId id="2147483648" r:id="rId1"/>
   </p:sldMasterIdLst>
   <p:notesMasterIdLst>
-    <p:notesMasterId r:id="rId6"/>
+    <p:notesMasterId r:id="rId7"/>
   </p:notesMasterIdLst>
   <p:sldIdLst>
     <p:sldId id="256" r:id="rId2"/>
     <p:sldId id="257" r:id="rId3"/>
-    <p:sldId id="258" r:id="rId4"/>
-    <p:sldId id="259" r:id="rId5"/>
+    <p:sldId id="260" r:id="rId4"/>
+    <p:sldId id="258" r:id="rId5"/>
+    <p:sldId id="259" r:id="rId6"/>
   </p:sldIdLst>
   <p:sldSz cx="12192000" cy="6858000"/>
   <p:notesSz cx="6858000" cy="9144000"/>
@@ -557,6 +558,264 @@
 </p:notes>
 </file>
 
+<file path=ppt/notesSlides/notesSlide2.xml><?xml version="1.0" encoding="utf-8"?>
+<p:notes xmlns:a="http://schemas.openxmlformats.org/drawingml/2006/main" xmlns:r="http://schemas.openxmlformats.org/officeDocument/2006/relationships" xmlns:p="http://schemas.openxmlformats.org/presentationml/2006/main">
+  <p:cSld>
+    <p:spTree>
+      <p:nvGrpSpPr>
+        <p:cNvPr id="1" name=""/>
+        <p:cNvGrpSpPr/>
+        <p:nvPr/>
+      </p:nvGrpSpPr>
+      <p:grpSpPr>
+        <a:xfrm>
+          <a:off x="0" y="0"/>
+          <a:ext cx="0" cy="0"/>
+          <a:chOff x="0" y="0"/>
+          <a:chExt cx="0" cy="0"/>
+        </a:xfrm>
+      </p:grpSpPr>
+      <p:sp>
+        <p:nvSpPr>
+          <p:cNvPr id="2" name="Slide Image Placeholder 1"/>
+          <p:cNvSpPr>
+            <a:spLocks noGrp="1" noRot="1" noChangeAspect="1"/>
+          </p:cNvSpPr>
+          <p:nvPr>
+            <p:ph type="sldImg"/>
+          </p:nvPr>
+        </p:nvSpPr>
+        <p:spPr/>
+      </p:sp>
+      <p:sp>
+        <p:nvSpPr>
+          <p:cNvPr id="3" name="Notes Placeholder 2"/>
+          <p:cNvSpPr>
+            <a:spLocks noGrp="1"/>
+          </p:cNvSpPr>
+          <p:nvPr>
+            <p:ph type="body" idx="1"/>
+          </p:nvPr>
+        </p:nvSpPr>
+        <p:spPr/>
+        <p:txBody>
+          <a:bodyPr/>
+          <a:lstStyle/>
+          <a:p>
+            <a:r>
+              <a:rPr lang="en-US" dirty="0"/>
+              <a:t>http://www.devtopics.com/101-great-computer-programming-quotes/</a:t>
+            </a:r>
+          </a:p>
+          <a:p>
+            <a:endParaRPr lang="en-US" dirty="0"/>
+          </a:p>
+        </p:txBody>
+      </p:sp>
+      <p:sp>
+        <p:nvSpPr>
+          <p:cNvPr id="4" name="Slide Number Placeholder 3"/>
+          <p:cNvSpPr>
+            <a:spLocks noGrp="1"/>
+          </p:cNvSpPr>
+          <p:nvPr>
+            <p:ph type="sldNum" sz="quarter" idx="5"/>
+          </p:nvPr>
+        </p:nvSpPr>
+        <p:spPr/>
+        <p:txBody>
+          <a:bodyPr/>
+          <a:lstStyle/>
+          <a:p>
+            <a:fld id="{1601906F-3049-48CF-8640-182E3E8A4FC6}" type="slidenum">
+              <a:rPr lang="en-US" smtClean="0"/>
+              <a:t>3</a:t>
+            </a:fld>
+            <a:endParaRPr lang="en-US"/>
+          </a:p>
+        </p:txBody>
+      </p:sp>
+    </p:spTree>
+    <p:extLst>
+      <p:ext uri="{BB962C8B-B14F-4D97-AF65-F5344CB8AC3E}">
+        <p14:creationId xmlns:p14="http://schemas.microsoft.com/office/powerpoint/2010/main" val="891512571"/>
+      </p:ext>
+    </p:extLst>
+  </p:cSld>
+  <p:clrMapOvr>
+    <a:masterClrMapping/>
+  </p:clrMapOvr>
+</p:notes>
+</file>
+
+<file path=ppt/notesSlides/notesSlide3.xml><?xml version="1.0" encoding="utf-8"?>
+<p:notes xmlns:a="http://schemas.openxmlformats.org/drawingml/2006/main" xmlns:r="http://schemas.openxmlformats.org/officeDocument/2006/relationships" xmlns:p="http://schemas.openxmlformats.org/presentationml/2006/main">
+  <p:cSld>
+    <p:spTree>
+      <p:nvGrpSpPr>
+        <p:cNvPr id="1" name=""/>
+        <p:cNvGrpSpPr/>
+        <p:nvPr/>
+      </p:nvGrpSpPr>
+      <p:grpSpPr>
+        <a:xfrm>
+          <a:off x="0" y="0"/>
+          <a:ext cx="0" cy="0"/>
+          <a:chOff x="0" y="0"/>
+          <a:chExt cx="0" cy="0"/>
+        </a:xfrm>
+      </p:grpSpPr>
+      <p:sp>
+        <p:nvSpPr>
+          <p:cNvPr id="2" name="Slide Image Placeholder 1"/>
+          <p:cNvSpPr>
+            <a:spLocks noGrp="1" noRot="1" noChangeAspect="1"/>
+          </p:cNvSpPr>
+          <p:nvPr>
+            <p:ph type="sldImg"/>
+          </p:nvPr>
+        </p:nvSpPr>
+        <p:spPr/>
+      </p:sp>
+      <p:sp>
+        <p:nvSpPr>
+          <p:cNvPr id="3" name="Notes Placeholder 2"/>
+          <p:cNvSpPr>
+            <a:spLocks noGrp="1"/>
+          </p:cNvSpPr>
+          <p:nvPr>
+            <p:ph type="body" idx="1"/>
+          </p:nvPr>
+        </p:nvSpPr>
+        <p:spPr/>
+        <p:txBody>
+          <a:bodyPr/>
+          <a:lstStyle/>
+          <a:p>
+            <a:endParaRPr lang="en-US" dirty="0"/>
+          </a:p>
+        </p:txBody>
+      </p:sp>
+      <p:sp>
+        <p:nvSpPr>
+          <p:cNvPr id="4" name="Slide Number Placeholder 3"/>
+          <p:cNvSpPr>
+            <a:spLocks noGrp="1"/>
+          </p:cNvSpPr>
+          <p:nvPr>
+            <p:ph type="sldNum" sz="quarter" idx="10"/>
+          </p:nvPr>
+        </p:nvSpPr>
+        <p:spPr/>
+        <p:txBody>
+          <a:bodyPr/>
+          <a:lstStyle/>
+          <a:p>
+            <a:fld id="{1601906F-3049-48CF-8640-182E3E8A4FC6}" type="slidenum">
+              <a:rPr lang="en-US" smtClean="0"/>
+              <a:t>4</a:t>
+            </a:fld>
+            <a:endParaRPr lang="en-US"/>
+          </a:p>
+        </p:txBody>
+      </p:sp>
+    </p:spTree>
+    <p:extLst>
+      <p:ext uri="{BB962C8B-B14F-4D97-AF65-F5344CB8AC3E}">
+        <p14:creationId xmlns:p14="http://schemas.microsoft.com/office/powerpoint/2010/main" val="2347849205"/>
+      </p:ext>
+    </p:extLst>
+  </p:cSld>
+  <p:clrMapOvr>
+    <a:masterClrMapping/>
+  </p:clrMapOvr>
+</p:notes>
+</file>
+
+<file path=ppt/notesSlides/notesSlide4.xml><?xml version="1.0" encoding="utf-8"?>
+<p:notes xmlns:a="http://schemas.openxmlformats.org/drawingml/2006/main" xmlns:r="http://schemas.openxmlformats.org/officeDocument/2006/relationships" xmlns:p="http://schemas.openxmlformats.org/presentationml/2006/main">
+  <p:cSld>
+    <p:spTree>
+      <p:nvGrpSpPr>
+        <p:cNvPr id="1" name=""/>
+        <p:cNvGrpSpPr/>
+        <p:nvPr/>
+      </p:nvGrpSpPr>
+      <p:grpSpPr>
+        <a:xfrm>
+          <a:off x="0" y="0"/>
+          <a:ext cx="0" cy="0"/>
+          <a:chOff x="0" y="0"/>
+          <a:chExt cx="0" cy="0"/>
+        </a:xfrm>
+      </p:grpSpPr>
+      <p:sp>
+        <p:nvSpPr>
+          <p:cNvPr id="2" name="Slide Image Placeholder 1"/>
+          <p:cNvSpPr>
+            <a:spLocks noGrp="1" noRot="1" noChangeAspect="1"/>
+          </p:cNvSpPr>
+          <p:nvPr>
+            <p:ph type="sldImg"/>
+          </p:nvPr>
+        </p:nvSpPr>
+        <p:spPr/>
+      </p:sp>
+      <p:sp>
+        <p:nvSpPr>
+          <p:cNvPr id="3" name="Notes Placeholder 2"/>
+          <p:cNvSpPr>
+            <a:spLocks noGrp="1"/>
+          </p:cNvSpPr>
+          <p:nvPr>
+            <p:ph type="body" idx="1"/>
+          </p:nvPr>
+        </p:nvSpPr>
+        <p:spPr/>
+        <p:txBody>
+          <a:bodyPr/>
+          <a:lstStyle/>
+          <a:p>
+            <a:endParaRPr lang="en-US" dirty="0"/>
+          </a:p>
+        </p:txBody>
+      </p:sp>
+      <p:sp>
+        <p:nvSpPr>
+          <p:cNvPr id="4" name="Slide Number Placeholder 3"/>
+          <p:cNvSpPr>
+            <a:spLocks noGrp="1"/>
+          </p:cNvSpPr>
+          <p:nvPr>
+            <p:ph type="sldNum" sz="quarter" idx="10"/>
+          </p:nvPr>
+        </p:nvSpPr>
+        <p:spPr/>
+        <p:txBody>
+          <a:bodyPr/>
+          <a:lstStyle/>
+          <a:p>
+            <a:fld id="{1601906F-3049-48CF-8640-182E3E8A4FC6}" type="slidenum">
+              <a:rPr lang="en-US" smtClean="0"/>
+              <a:t>5</a:t>
+            </a:fld>
+            <a:endParaRPr lang="en-US"/>
+          </a:p>
+        </p:txBody>
+      </p:sp>
+    </p:spTree>
+    <p:extLst>
+      <p:ext uri="{BB962C8B-B14F-4D97-AF65-F5344CB8AC3E}">
+        <p14:creationId xmlns:p14="http://schemas.microsoft.com/office/powerpoint/2010/main" val="1221532610"/>
+      </p:ext>
+    </p:extLst>
+  </p:cSld>
+  <p:clrMapOvr>
+    <a:masterClrMapping/>
+  </p:clrMapOvr>
+</p:notes>
+</file>
+
 <file path=ppt/slideLayouts/slideLayout1.xml><?xml version="1.0" encoding="utf-8"?>
 <p:sldLayout xmlns:a="http://schemas.openxmlformats.org/drawingml/2006/main" xmlns:r="http://schemas.openxmlformats.org/officeDocument/2006/relationships" xmlns:p="http://schemas.openxmlformats.org/presentationml/2006/main" type="title" preserve="1">
   <p:cSld name="Title Slide">
@@ -652,7 +911,7 @@
           <a:effectLst/>
           <a:extLst>
             <a:ext uri="{91240B29-F687-4f45-9708-019B960494DF}">
-              <a14:hiddenLine xmlns="" xmlns:a14="http://schemas.microsoft.com/office/drawing/2010/main" w="9525">
+              <a14:hiddenLine xmlns:a14="http://schemas.microsoft.com/office/drawing/2010/main" xmlns="" w="9525">
                 <a:solidFill>
                   <a:srgbClr val="000000"/>
                 </a:solidFill>
@@ -2162,7 +2421,7 @@
           <a:ln/>
           <a:extLst>
             <a:ext uri="{91240B29-F687-4f45-9708-019B960494DF}">
-              <a14:hiddenLine xmlns="" xmlns:a14="http://schemas.microsoft.com/office/drawing/2010/main" w="9525">
+              <a14:hiddenLine xmlns:a14="http://schemas.microsoft.com/office/drawing/2010/main" xmlns="" w="9525">
                 <a:solidFill>
                   <a:srgbClr val="000000"/>
                 </a:solidFill>
@@ -2434,7 +2693,7 @@
           <a:ln/>
           <a:extLst>
             <a:ext uri="{91240B29-F687-4f45-9708-019B960494DF}">
-              <a14:hiddenLine xmlns="" xmlns:a14="http://schemas.microsoft.com/office/drawing/2010/main" w="9525">
+              <a14:hiddenLine xmlns:a14="http://schemas.microsoft.com/office/drawing/2010/main" xmlns="" w="9525">
                 <a:solidFill>
                   <a:srgbClr val="000000"/>
                 </a:solidFill>
@@ -2714,7 +2973,7 @@
           <a:ln/>
           <a:extLst>
             <a:ext uri="{91240B29-F687-4f45-9708-019B960494DF}">
-              <a14:hiddenLine xmlns="" xmlns:a14="http://schemas.microsoft.com/office/drawing/2010/main" w="9525">
+              <a14:hiddenLine xmlns:a14="http://schemas.microsoft.com/office/drawing/2010/main" xmlns="" w="9525">
                 <a:solidFill>
                   <a:srgbClr val="000000"/>
                 </a:solidFill>
@@ -3334,7 +3593,7 @@
           <a:ln/>
           <a:extLst>
             <a:ext uri="{91240B29-F687-4f45-9708-019B960494DF}">
-              <a14:hiddenLine xmlns="" xmlns:a14="http://schemas.microsoft.com/office/drawing/2010/main" w="9525">
+              <a14:hiddenLine xmlns:a14="http://schemas.microsoft.com/office/drawing/2010/main" xmlns="" w="9525">
                 <a:solidFill>
                   <a:srgbClr val="000000"/>
                 </a:solidFill>
@@ -3670,7 +3929,7 @@
           <a:ln/>
           <a:extLst>
             <a:ext uri="{91240B29-F687-4f45-9708-019B960494DF}">
-              <a14:hiddenLine xmlns="" xmlns:a14="http://schemas.microsoft.com/office/drawing/2010/main" w="9525">
+              <a14:hiddenLine xmlns:a14="http://schemas.microsoft.com/office/drawing/2010/main" xmlns="" w="9525">
                 <a:solidFill>
                   <a:srgbClr val="000000"/>
                 </a:solidFill>
@@ -4144,7 +4403,7 @@
           <a:ln/>
           <a:extLst>
             <a:ext uri="{91240B29-F687-4f45-9708-019B960494DF}">
-              <a14:hiddenLine xmlns="" xmlns:a14="http://schemas.microsoft.com/office/drawing/2010/main" w="9525">
+              <a14:hiddenLine xmlns:a14="http://schemas.microsoft.com/office/drawing/2010/main" xmlns="" w="9525">
                 <a:solidFill>
                   <a:srgbClr val="000000"/>
                 </a:solidFill>
@@ -4567,7 +4826,7 @@
           <a:ln/>
           <a:extLst>
             <a:ext uri="{91240B29-F687-4f45-9708-019B960494DF}">
-              <a14:hiddenLine xmlns="" xmlns:a14="http://schemas.microsoft.com/office/drawing/2010/main" w="9525">
+              <a14:hiddenLine xmlns:a14="http://schemas.microsoft.com/office/drawing/2010/main" xmlns="" w="9525">
                 <a:solidFill>
                   <a:srgbClr val="000000"/>
                 </a:solidFill>
@@ -5795,7 +6054,7 @@
           <p:cNvPr id="2" name="Title 1">
             <a:extLst>
               <a:ext uri="{FF2B5EF4-FFF2-40B4-BE49-F238E27FC236}">
-                <a16:creationId xmlns:a16="http://schemas.microsoft.com/office/drawing/2014/main" xmlns="" id="{02B720D8-8B56-4C56-BBED-E5BE79EFB2C2}"/>
+                <a16:creationId xmlns="" xmlns:a16="http://schemas.microsoft.com/office/drawing/2014/main" id="{02B720D8-8B56-4C56-BBED-E5BE79EFB2C2}"/>
               </a:ext>
             </a:extLst>
           </p:cNvPr>
@@ -5823,7 +6082,7 @@
           <p:cNvPr id="3" name="Subtitle 2">
             <a:extLst>
               <a:ext uri="{FF2B5EF4-FFF2-40B4-BE49-F238E27FC236}">
-                <a16:creationId xmlns:a16="http://schemas.microsoft.com/office/drawing/2014/main" xmlns="" id="{B22C053C-BF50-4DDB-9ACD-B606A223883E}"/>
+                <a16:creationId xmlns="" xmlns:a16="http://schemas.microsoft.com/office/drawing/2014/main" id="{B22C053C-BF50-4DDB-9ACD-B606A223883E}"/>
               </a:ext>
             </a:extLst>
           </p:cNvPr>
@@ -5861,6 +6120,13 @@
   <p:clrMapOvr>
     <a:masterClrMapping/>
   </p:clrMapOvr>
+  <p:timing>
+    <p:tnLst>
+      <p:par>
+        <p:cTn id="1" dur="indefinite" restart="never" nodeType="tmRoot"/>
+      </p:par>
+    </p:tnLst>
+  </p:timing>
 </p:sld>
 </file>
 
@@ -5886,7 +6152,7 @@
           <p:cNvPr id="2" name="Title 1">
             <a:extLst>
               <a:ext uri="{FF2B5EF4-FFF2-40B4-BE49-F238E27FC236}">
-                <a16:creationId xmlns:a16="http://schemas.microsoft.com/office/drawing/2014/main" xmlns="" id="{3D8C66E3-CB5C-4FF0-A92F-66BCBDA7072B}"/>
+                <a16:creationId xmlns="" xmlns:a16="http://schemas.microsoft.com/office/drawing/2014/main" id="{3D8C66E3-CB5C-4FF0-A92F-66BCBDA7072B}"/>
               </a:ext>
             </a:extLst>
           </p:cNvPr>
@@ -5909,34 +6175,41 @@
           </a:p>
         </p:txBody>
       </p:sp>
-      <p:sp>
-        <p:nvSpPr>
-          <p:cNvPr id="3" name="Content Placeholder 2">
+      <p:pic>
+        <p:nvPicPr>
+          <p:cNvPr id="4" name="Picture 3"/>
+          <p:cNvPicPr>
+            <a:picLocks noChangeAspect="1"/>
+          </p:cNvPicPr>
+          <p:nvPr/>
+        </p:nvPicPr>
+        <p:blipFill rotWithShape="1">
+          <a:blip r:embed="rId3">
             <a:extLst>
-              <a:ext uri="{FF2B5EF4-FFF2-40B4-BE49-F238E27FC236}">
-                <a16:creationId xmlns:a16="http://schemas.microsoft.com/office/drawing/2014/main" xmlns="" id="{2CBCD0E3-DA1E-4840-B782-70AFB2F15C41}"/>
+              <a:ext uri="{BEBA8EAE-BF5A-486C-A8C5-ECC9F3942E4B}">
+                <a14:imgProps xmlns:a14="http://schemas.microsoft.com/office/drawing/2010/main">
+                  <a14:imgLayer r:embed="rId4">
+                    <a14:imgEffect>
+                      <a14:sharpenSoften amount="11000"/>
+                    </a14:imgEffect>
+                  </a14:imgLayer>
+                </a14:imgProps>
               </a:ext>
             </a:extLst>
-          </p:cNvPr>
-          <p:cNvSpPr>
-            <a:spLocks noGrp="1"/>
-          </p:cNvSpPr>
-          <p:nvPr>
-            <p:ph idx="1"/>
-          </p:nvPr>
-        </p:nvSpPr>
-        <p:spPr/>
-        <p:txBody>
-          <a:bodyPr/>
-          <a:lstStyle/>
-          <a:p>
-            <a:r>
-              <a:rPr lang="en-US" dirty="0"/>
-              <a:t>This slide will have an example of a cryptogram</a:t>
-            </a:r>
-          </a:p>
-        </p:txBody>
-      </p:sp>
+          </a:blip>
+          <a:srcRect l="31170" t="24287" r="8486" b="37470"/>
+          <a:stretch/>
+        </p:blipFill>
+        <p:spPr>
+          <a:xfrm>
+            <a:off x="1913642" y="2516683"/>
+            <a:ext cx="8231829" cy="3280800"/>
+          </a:xfrm>
+          <a:prstGeom prst="rect">
+            <a:avLst/>
+          </a:prstGeom>
+        </p:spPr>
+      </p:pic>
     </p:spTree>
     <p:extLst>
       <p:ext uri="{BB962C8B-B14F-4D97-AF65-F5344CB8AC3E}">
@@ -5947,6 +6220,13 @@
   <p:clrMapOvr>
     <a:masterClrMapping/>
   </p:clrMapOvr>
+  <p:timing>
+    <p:tnLst>
+      <p:par>
+        <p:cTn id="1" dur="indefinite" restart="never" nodeType="tmRoot"/>
+      </p:par>
+    </p:tnLst>
+  </p:timing>
 </p:sld>
 </file>
 
@@ -5972,7 +6252,95 @@
           <p:cNvPr id="2" name="Title 1">
             <a:extLst>
               <a:ext uri="{FF2B5EF4-FFF2-40B4-BE49-F238E27FC236}">
-                <a16:creationId xmlns:a16="http://schemas.microsoft.com/office/drawing/2014/main" xmlns="" id="{4525FAB5-CBD7-4AB9-AC50-BE0C5C6A4E45}"/>
+                <a16:creationId xmlns="" xmlns:a16="http://schemas.microsoft.com/office/drawing/2014/main" id="{3D8C66E3-CB5C-4FF0-A92F-66BCBDA7072B}"/>
+              </a:ext>
+            </a:extLst>
+          </p:cNvPr>
+          <p:cNvSpPr>
+            <a:spLocks noGrp="1"/>
+          </p:cNvSpPr>
+          <p:nvPr>
+            <p:ph type="title"/>
+          </p:nvPr>
+        </p:nvSpPr>
+        <p:spPr/>
+        <p:txBody>
+          <a:bodyPr/>
+          <a:lstStyle/>
+          <a:p>
+            <a:r>
+              <a:rPr lang="en-US" dirty="0"/>
+              <a:t>What is a cryptogram?</a:t>
+            </a:r>
+          </a:p>
+        </p:txBody>
+      </p:sp>
+      <p:pic>
+        <p:nvPicPr>
+          <p:cNvPr id="3" name="Picture 2"/>
+          <p:cNvPicPr>
+            <a:picLocks noChangeAspect="1"/>
+          </p:cNvPicPr>
+          <p:nvPr/>
+        </p:nvPicPr>
+        <p:blipFill rotWithShape="1">
+          <a:blip r:embed="rId3"/>
+          <a:srcRect l="31975" t="24562" r="8556" b="37195"/>
+          <a:stretch/>
+        </p:blipFill>
+        <p:spPr>
+          <a:xfrm>
+            <a:off x="1911096" y="2469822"/>
+            <a:ext cx="8115362" cy="3281915"/>
+          </a:xfrm>
+          <a:prstGeom prst="rect">
+            <a:avLst/>
+          </a:prstGeom>
+        </p:spPr>
+      </p:pic>
+    </p:spTree>
+    <p:extLst>
+      <p:ext uri="{BB962C8B-B14F-4D97-AF65-F5344CB8AC3E}">
+        <p14:creationId xmlns:p14="http://schemas.microsoft.com/office/powerpoint/2010/main" val="2331258346"/>
+      </p:ext>
+    </p:extLst>
+  </p:cSld>
+  <p:clrMapOvr>
+    <a:masterClrMapping/>
+  </p:clrMapOvr>
+  <p:timing>
+    <p:tnLst>
+      <p:par>
+        <p:cTn id="1" dur="indefinite" restart="never" nodeType="tmRoot"/>
+      </p:par>
+    </p:tnLst>
+  </p:timing>
+</p:sld>
+</file>
+
+<file path=ppt/slides/slide4.xml><?xml version="1.0" encoding="utf-8"?>
+<p:sld xmlns:a="http://schemas.openxmlformats.org/drawingml/2006/main" xmlns:r="http://schemas.openxmlformats.org/officeDocument/2006/relationships" xmlns:p="http://schemas.openxmlformats.org/presentationml/2006/main">
+  <p:cSld>
+    <p:spTree>
+      <p:nvGrpSpPr>
+        <p:cNvPr id="1" name=""/>
+        <p:cNvGrpSpPr/>
+        <p:nvPr/>
+      </p:nvGrpSpPr>
+      <p:grpSpPr>
+        <a:xfrm>
+          <a:off x="0" y="0"/>
+          <a:ext cx="0" cy="0"/>
+          <a:chOff x="0" y="0"/>
+          <a:chExt cx="0" cy="0"/>
+        </a:xfrm>
+      </p:grpSpPr>
+      <p:sp>
+        <p:nvSpPr>
+          <p:cNvPr id="2" name="Title 1">
+            <a:extLst>
+              <a:ext uri="{FF2B5EF4-FFF2-40B4-BE49-F238E27FC236}">
+                <a16:creationId xmlns="" xmlns:a16="http://schemas.microsoft.com/office/drawing/2014/main" id="{4525FAB5-CBD7-4AB9-AC50-BE0C5C6A4E45}"/>
               </a:ext>
             </a:extLst>
           </p:cNvPr>
@@ -6000,7 +6368,7 @@
           <p:cNvPr id="5" name="Content Placeholder 4" descr="A screenshot of a cell phone&#10;&#10;Description automatically generated">
             <a:extLst>
               <a:ext uri="{FF2B5EF4-FFF2-40B4-BE49-F238E27FC236}">
-                <a16:creationId xmlns:a16="http://schemas.microsoft.com/office/drawing/2014/main" xmlns="" id="{2364CB49-C87B-4456-915D-C7E2886BD326}"/>
+                <a16:creationId xmlns="" xmlns:a16="http://schemas.microsoft.com/office/drawing/2014/main" id="{2364CB49-C87B-4456-915D-C7E2886BD326}"/>
               </a:ext>
             </a:extLst>
           </p:cNvPr>
@@ -6012,7 +6380,7 @@
           </p:nvPr>
         </p:nvPicPr>
         <p:blipFill>
-          <a:blip r:embed="rId2"/>
+          <a:blip r:embed="rId3"/>
           <a:stretch>
             <a:fillRect/>
           </a:stretch>
@@ -6034,10 +6402,17 @@
   <p:clrMapOvr>
     <a:masterClrMapping/>
   </p:clrMapOvr>
+  <p:timing>
+    <p:tnLst>
+      <p:par>
+        <p:cTn id="1" dur="indefinite" restart="never" nodeType="tmRoot"/>
+      </p:par>
+    </p:tnLst>
+  </p:timing>
 </p:sld>
 </file>
 
-<file path=ppt/slides/slide4.xml><?xml version="1.0" encoding="utf-8"?>
+<file path=ppt/slides/slide5.xml><?xml version="1.0" encoding="utf-8"?>
 <p:sld xmlns:a="http://schemas.openxmlformats.org/drawingml/2006/main" xmlns:r="http://schemas.openxmlformats.org/officeDocument/2006/relationships" xmlns:p="http://schemas.openxmlformats.org/presentationml/2006/main">
   <p:cSld>
     <p:spTree>
@@ -6059,7 +6434,7 @@
           <p:cNvPr id="2" name="Title 1">
             <a:extLst>
               <a:ext uri="{FF2B5EF4-FFF2-40B4-BE49-F238E27FC236}">
-                <a16:creationId xmlns:a16="http://schemas.microsoft.com/office/drawing/2014/main" xmlns="" id="{64815808-9601-4596-A490-C488F5877968}"/>
+                <a16:creationId xmlns="" xmlns:a16="http://schemas.microsoft.com/office/drawing/2014/main" id="{64815808-9601-4596-A490-C488F5877968}"/>
               </a:ext>
             </a:extLst>
           </p:cNvPr>
@@ -6088,7 +6463,7 @@
           <p:cNvPr id="3" name="Content Placeholder 2">
             <a:extLst>
               <a:ext uri="{FF2B5EF4-FFF2-40B4-BE49-F238E27FC236}">
-                <a16:creationId xmlns:a16="http://schemas.microsoft.com/office/drawing/2014/main" xmlns="" id="{65B3BFF0-324E-49E1-8E41-F49395F957EC}"/>
+                <a16:creationId xmlns="" xmlns:a16="http://schemas.microsoft.com/office/drawing/2014/main" id="{65B3BFF0-324E-49E1-8E41-F49395F957EC}"/>
               </a:ext>
             </a:extLst>
           </p:cNvPr>
@@ -6101,10 +6476,30 @@
         </p:nvSpPr>
         <p:spPr/>
         <p:txBody>
-          <a:bodyPr/>
-          <a:lstStyle/>
-          <a:p>
-            <a:endParaRPr lang="en-US" dirty="0"/>
+          <a:bodyPr>
+            <a:normAutofit/>
+          </a:bodyPr>
+          <a:lstStyle/>
+          <a:p>
+            <a:r>
+              <a:rPr lang="en-US" sz="4400" dirty="0" smtClean="0"/>
+              <a:t>Solve like </a:t>
+            </a:r>
+          </a:p>
+          <a:p>
+            <a:pPr lvl="1"/>
+            <a:r>
+              <a:rPr lang="en-US" sz="4000" dirty="0" smtClean="0"/>
+              <a:t>A human</a:t>
+            </a:r>
+          </a:p>
+          <a:p>
+            <a:pPr lvl="1"/>
+            <a:r>
+              <a:rPr lang="en-US" sz="4000" dirty="0" smtClean="0"/>
+              <a:t>Or a computer?</a:t>
+            </a:r>
+            <a:endParaRPr lang="en-US" sz="4000" dirty="0"/>
           </a:p>
         </p:txBody>
       </p:sp>
@@ -6118,6 +6513,13 @@
   <p:clrMapOvr>
     <a:masterClrMapping/>
   </p:clrMapOvr>
+  <p:timing>
+    <p:tnLst>
+      <p:par>
+        <p:cTn id="1" dur="indefinite" restart="never" nodeType="tmRoot"/>
+      </p:par>
+    </p:tnLst>
+  </p:timing>
 </p:sld>
 </file>
 

</xml_diff>

<commit_message>
still working on new method
</commit_message>
<xml_diff>
--- a/cryptoSolver/Crypto-Solver.pptx
+++ b/cryptoSolver/Crypto-Solver.pptx
@@ -776,6 +776,10 @@
           <a:bodyPr/>
           <a:lstStyle/>
           <a:p>
+            <a:r>
+              <a:rPr lang="en-US" dirty="0" smtClean="0"/>
+              <a:t>With</a:t>
+            </a:r>
             <a:endParaRPr lang="en-US" dirty="0"/>
           </a:p>
         </p:txBody>

</xml_diff>